<commit_message>
Changed the notation of the figures
I have changed the notation of the figures to macth the text.
</commit_message>
<xml_diff>
--- a/StudentGuideModule1/friction/force_diagram.pptx
+++ b/StudentGuideModule1/friction/force_diagram.pptx
@@ -197,7 +197,7 @@
           <a:p>
             <a:fld id="{08534379-A8CA-4620-88FC-C95BC8BE7BED}" type="datetimeFigureOut">
               <a:rPr lang="en-US" smtClean="0"/>
-              <a:t>7/23/2019</a:t>
+              <a:t>7/24/2019</a:t>
             </a:fld>
             <a:endParaRPr lang="en-US"/>
           </a:p>
@@ -677,7 +677,7 @@
           <a:p>
             <a:fld id="{62726365-80EF-4A22-BD1B-8B7BA9D18AD5}" type="datetimeFigureOut">
               <a:rPr lang="en-US" smtClean="0"/>
-              <a:t>7/23/2019</a:t>
+              <a:t>7/24/2019</a:t>
             </a:fld>
             <a:endParaRPr lang="en-US"/>
           </a:p>
@@ -845,7 +845,7 @@
           <a:p>
             <a:fld id="{62726365-80EF-4A22-BD1B-8B7BA9D18AD5}" type="datetimeFigureOut">
               <a:rPr lang="en-US" smtClean="0"/>
-              <a:t>7/23/2019</a:t>
+              <a:t>7/24/2019</a:t>
             </a:fld>
             <a:endParaRPr lang="en-US"/>
           </a:p>
@@ -1023,7 +1023,7 @@
           <a:p>
             <a:fld id="{62726365-80EF-4A22-BD1B-8B7BA9D18AD5}" type="datetimeFigureOut">
               <a:rPr lang="en-US" smtClean="0"/>
-              <a:t>7/23/2019</a:t>
+              <a:t>7/24/2019</a:t>
             </a:fld>
             <a:endParaRPr lang="en-US"/>
           </a:p>
@@ -1191,7 +1191,7 @@
           <a:p>
             <a:fld id="{62726365-80EF-4A22-BD1B-8B7BA9D18AD5}" type="datetimeFigureOut">
               <a:rPr lang="en-US" smtClean="0"/>
-              <a:t>7/23/2019</a:t>
+              <a:t>7/24/2019</a:t>
             </a:fld>
             <a:endParaRPr lang="en-US"/>
           </a:p>
@@ -1436,7 +1436,7 @@
           <a:p>
             <a:fld id="{62726365-80EF-4A22-BD1B-8B7BA9D18AD5}" type="datetimeFigureOut">
               <a:rPr lang="en-US" smtClean="0"/>
-              <a:t>7/23/2019</a:t>
+              <a:t>7/24/2019</a:t>
             </a:fld>
             <a:endParaRPr lang="en-US"/>
           </a:p>
@@ -1665,7 +1665,7 @@
           <a:p>
             <a:fld id="{62726365-80EF-4A22-BD1B-8B7BA9D18AD5}" type="datetimeFigureOut">
               <a:rPr lang="en-US" smtClean="0"/>
-              <a:t>7/23/2019</a:t>
+              <a:t>7/24/2019</a:t>
             </a:fld>
             <a:endParaRPr lang="en-US"/>
           </a:p>
@@ -2029,7 +2029,7 @@
           <a:p>
             <a:fld id="{62726365-80EF-4A22-BD1B-8B7BA9D18AD5}" type="datetimeFigureOut">
               <a:rPr lang="en-US" smtClean="0"/>
-              <a:t>7/23/2019</a:t>
+              <a:t>7/24/2019</a:t>
             </a:fld>
             <a:endParaRPr lang="en-US"/>
           </a:p>
@@ -2146,7 +2146,7 @@
           <a:p>
             <a:fld id="{62726365-80EF-4A22-BD1B-8B7BA9D18AD5}" type="datetimeFigureOut">
               <a:rPr lang="en-US" smtClean="0"/>
-              <a:t>7/23/2019</a:t>
+              <a:t>7/24/2019</a:t>
             </a:fld>
             <a:endParaRPr lang="en-US"/>
           </a:p>
@@ -2241,7 +2241,7 @@
           <a:p>
             <a:fld id="{62726365-80EF-4A22-BD1B-8B7BA9D18AD5}" type="datetimeFigureOut">
               <a:rPr lang="en-US" smtClean="0"/>
-              <a:t>7/23/2019</a:t>
+              <a:t>7/24/2019</a:t>
             </a:fld>
             <a:endParaRPr lang="en-US"/>
           </a:p>
@@ -2516,7 +2516,7 @@
           <a:p>
             <a:fld id="{62726365-80EF-4A22-BD1B-8B7BA9D18AD5}" type="datetimeFigureOut">
               <a:rPr lang="en-US" smtClean="0"/>
-              <a:t>7/23/2019</a:t>
+              <a:t>7/24/2019</a:t>
             </a:fld>
             <a:endParaRPr lang="en-US"/>
           </a:p>
@@ -2768,7 +2768,7 @@
           <a:p>
             <a:fld id="{62726365-80EF-4A22-BD1B-8B7BA9D18AD5}" type="datetimeFigureOut">
               <a:rPr lang="en-US" smtClean="0"/>
-              <a:t>7/23/2019</a:t>
+              <a:t>7/24/2019</a:t>
             </a:fld>
             <a:endParaRPr lang="en-US"/>
           </a:p>
@@ -2979,7 +2979,7 @@
           <a:p>
             <a:fld id="{62726365-80EF-4A22-BD1B-8B7BA9D18AD5}" type="datetimeFigureOut">
               <a:rPr lang="en-US" smtClean="0"/>
-              <a:t>7/23/2019</a:t>
+              <a:t>7/24/2019</a:t>
             </a:fld>
             <a:endParaRPr lang="en-US"/>
           </a:p>
@@ -4050,8 +4050,8 @@
           </mc:Fallback>
         </mc:AlternateContent>
       </p:grpSp>
-      <mc:AlternateContent xmlns:mc="http://schemas.openxmlformats.org/markup-compatibility/2006">
-        <mc:Choice xmlns:a14="http://schemas.microsoft.com/office/drawing/2010/main" Requires="a14">
+      <mc:AlternateContent xmlns:mc="http://schemas.openxmlformats.org/markup-compatibility/2006" xmlns:a14="http://schemas.microsoft.com/office/drawing/2010/main">
+        <mc:Choice Requires="a14">
           <p:sp>
             <p:nvSpPr>
               <p:cNvPr id="31" name="TextBox 30"/>
@@ -4129,7 +4129,7 @@
             </p:txBody>
           </p:sp>
         </mc:Choice>
-        <mc:Fallback>
+        <mc:Fallback xmlns="">
           <p:sp>
             <p:nvSpPr>
               <p:cNvPr id="31" name="TextBox 30"/>
@@ -4168,8 +4168,8 @@
           </p:sp>
         </mc:Fallback>
       </mc:AlternateContent>
-      <mc:AlternateContent xmlns:mc="http://schemas.openxmlformats.org/markup-compatibility/2006">
-        <mc:Choice xmlns:a14="http://schemas.microsoft.com/office/drawing/2010/main" Requires="a14">
+      <mc:AlternateContent xmlns:mc="http://schemas.openxmlformats.org/markup-compatibility/2006" xmlns:a14="http://schemas.microsoft.com/office/drawing/2010/main">
+        <mc:Choice Requires="a14">
           <p:sp>
             <p:nvSpPr>
               <p:cNvPr id="32" name="TextBox 31"/>
@@ -4225,7 +4225,7 @@
             </p:txBody>
           </p:sp>
         </mc:Choice>
-        <mc:Fallback>
+        <mc:Fallback xmlns="">
           <p:sp>
             <p:nvSpPr>
               <p:cNvPr id="32" name="TextBox 31"/>
@@ -4360,6 +4360,53 @@
           </p:sp>
         </mc:Fallback>
       </mc:AlternateContent>
+      <p:sp>
+        <p:nvSpPr>
+          <p:cNvPr id="20" name="Arc 19">
+            <a:extLst>
+              <a:ext uri="{FF2B5EF4-FFF2-40B4-BE49-F238E27FC236}">
+                <a16:creationId xmlns:a16="http://schemas.microsoft.com/office/drawing/2014/main" id="{E42A5689-8217-4639-A6F4-4B718CB7E03E}"/>
+              </a:ext>
+            </a:extLst>
+          </p:cNvPr>
+          <p:cNvSpPr/>
+          <p:nvPr/>
+        </p:nvSpPr>
+        <p:spPr>
+          <a:xfrm>
+            <a:off x="2893956" y="2913848"/>
+            <a:ext cx="117335" cy="169537"/>
+          </a:xfrm>
+          <a:prstGeom prst="arc">
+            <a:avLst>
+              <a:gd name="adj1" fmla="val 16200000"/>
+              <a:gd name="adj2" fmla="val 2145240"/>
+            </a:avLst>
+          </a:prstGeom>
+        </p:spPr>
+        <p:style>
+          <a:lnRef idx="1">
+            <a:schemeClr val="dk1"/>
+          </a:lnRef>
+          <a:fillRef idx="0">
+            <a:schemeClr val="dk1"/>
+          </a:fillRef>
+          <a:effectRef idx="0">
+            <a:schemeClr val="dk1"/>
+          </a:effectRef>
+          <a:fontRef idx="minor">
+            <a:schemeClr val="tx1"/>
+          </a:fontRef>
+        </p:style>
+        <p:txBody>
+          <a:bodyPr rtlCol="0" anchor="ctr"/>
+          <a:lstStyle/>
+          <a:p>
+            <a:pPr algn="ctr"/>
+            <a:endParaRPr lang="en-US"/>
+          </a:p>
+        </p:txBody>
+      </p:sp>
     </p:spTree>
     <p:extLst>
       <p:ext uri="{BB962C8B-B14F-4D97-AF65-F5344CB8AC3E}">

</xml_diff>

<commit_message>
minor chnages on the figures
</commit_message>
<xml_diff>
--- a/StudentGuideModule1/friction/force_diagram.pptx
+++ b/StudentGuideModule1/friction/force_diagram.pptx
@@ -3719,7 +3719,7 @@
             </p:nvSpPr>
             <p:spPr>
               <a:xfrm>
-                <a:off x="4055559" y="2401674"/>
+                <a:off x="4084152" y="2515193"/>
                 <a:ext cx="283405" cy="276999"/>
               </a:xfrm>
               <a:prstGeom prst="rect">
@@ -3765,7 +3765,7 @@
             </p:nvSpPr>
             <p:spPr>
               <a:xfrm>
-                <a:off x="4055559" y="2401674"/>
+                <a:off x="4084152" y="2515193"/>
                 <a:ext cx="283405" cy="276999"/>
               </a:xfrm>
               <a:prstGeom prst="rect">
@@ -4374,7 +4374,54 @@
         </p:nvSpPr>
         <p:spPr>
           <a:xfrm>
-            <a:off x="2893956" y="2913848"/>
+            <a:off x="2909858" y="2906008"/>
+            <a:ext cx="117335" cy="169537"/>
+          </a:xfrm>
+          <a:prstGeom prst="arc">
+            <a:avLst>
+              <a:gd name="adj1" fmla="val 16200000"/>
+              <a:gd name="adj2" fmla="val 2145240"/>
+            </a:avLst>
+          </a:prstGeom>
+        </p:spPr>
+        <p:style>
+          <a:lnRef idx="1">
+            <a:schemeClr val="dk1"/>
+          </a:lnRef>
+          <a:fillRef idx="0">
+            <a:schemeClr val="dk1"/>
+          </a:fillRef>
+          <a:effectRef idx="0">
+            <a:schemeClr val="dk1"/>
+          </a:effectRef>
+          <a:fontRef idx="minor">
+            <a:schemeClr val="tx1"/>
+          </a:fontRef>
+        </p:style>
+        <p:txBody>
+          <a:bodyPr rtlCol="0" anchor="ctr"/>
+          <a:lstStyle/>
+          <a:p>
+            <a:pPr algn="ctr"/>
+            <a:endParaRPr lang="en-US"/>
+          </a:p>
+        </p:txBody>
+      </p:sp>
+      <p:sp>
+        <p:nvSpPr>
+          <p:cNvPr id="21" name="Arc 20">
+            <a:extLst>
+              <a:ext uri="{FF2B5EF4-FFF2-40B4-BE49-F238E27FC236}">
+                <a16:creationId xmlns:a16="http://schemas.microsoft.com/office/drawing/2014/main" id="{3D6CE699-E701-4500-B7D7-0CB003793F48}"/>
+              </a:ext>
+            </a:extLst>
+          </p:cNvPr>
+          <p:cNvSpPr/>
+          <p:nvPr/>
+        </p:nvSpPr>
+        <p:spPr>
+          <a:xfrm rot="5913763">
+            <a:off x="4118044" y="2418233"/>
             <a:ext cx="117335" cy="169537"/>
           </a:xfrm>
           <a:prstGeom prst="arc">

</xml_diff>